<commit_message>
modified file: Week 3/G2M_Case_Study-Ahmed_Abubekr.pptx
</commit_message>
<xml_diff>
--- a/Week 3/G2M_Case_Study-Ahmed_Abubekr.pptx
+++ b/Week 3/G2M_Case_Study-Ahmed_Abubekr.pptx
@@ -3409,7 +3409,7 @@
         <p:spPr>
           <a:xfrm>
             <a:off x="870857" y="2380343"/>
-            <a:ext cx="5885457" cy="2877711"/>
+            <a:ext cx="8873711" cy="3893374"/>
           </a:xfrm>
           <a:prstGeom prst="rect">
             <a:avLst/>
@@ -3432,6 +3432,16 @@
                   <a:srgbClr val="FF6600"/>
                 </a:solidFill>
               </a:rPr>
+              <a:t>Exploratory Data Analysis</a:t>
+            </a:r>
+          </a:p>
+          <a:p>
+            <a:r>
+              <a:rPr lang="en-US" sz="6600" dirty="0">
+                <a:solidFill>
+                  <a:srgbClr val="FF6600"/>
+                </a:solidFill>
+              </a:rPr>
               <a:t>G2M Case Study</a:t>
             </a:r>
           </a:p>
@@ -3477,7 +3487,7 @@
                   <a:srgbClr val="FF6600"/>
                 </a:solidFill>
               </a:rPr>
-              <a:t>20-Jan-2021</a:t>
+              <a:t>20-Jan-2023</a:t>
             </a:r>
           </a:p>
         </p:txBody>

</xml_diff>